<commit_message>
Uploading completed presentation/pdf\n\nas I forgot to do that once I had submitted the assignment
</commit_message>
<xml_diff>
--- a/psn/Design Presentation.pptx
+++ b/psn/Design Presentation.pptx
@@ -11,6 +11,12 @@
     <p:sldId id="259" r:id="rId5"/>
     <p:sldId id="260" r:id="rId6"/>
     <p:sldId id="261" r:id="rId7"/>
+    <p:sldId id="262" r:id="rId8"/>
+    <p:sldId id="263" r:id="rId9"/>
+    <p:sldId id="264" r:id="rId10"/>
+    <p:sldId id="265" r:id="rId11"/>
+    <p:sldId id="266" r:id="rId12"/>
+    <p:sldId id="268" r:id="rId13"/>
   </p:sldIdLst>
   <p:sldSz cx="9144000" cy="6858000" type="screen4x3"/>
   <p:notesSz cx="6858000" cy="9144000"/>
@@ -109,6 +115,22 @@
       </a:defRPr>
     </a:lvl9pPr>
   </p:defaultTextStyle>
+  <p:extLst>
+    <p:ext uri="{EFAFB233-063F-42B5-8137-9DF3F51BA10A}">
+      <p15:sldGuideLst xmlns:p15="http://schemas.microsoft.com/office/powerpoint/2012/main">
+        <p15:guide id="1" orient="horz" pos="2160">
+          <p15:clr>
+            <a:srgbClr val="A4A3A4"/>
+          </p15:clr>
+        </p15:guide>
+        <p15:guide id="2" pos="2880">
+          <p15:clr>
+            <a:srgbClr val="A4A3A4"/>
+          </p15:clr>
+        </p15:guide>
+      </p15:sldGuideLst>
+    </p:ext>
+  </p:extLst>
 </p:presentation>
 </file>
 
@@ -4759,6 +4781,336 @@
     <p:extLst>
       <p:ext uri="{BB962C8B-B14F-4D97-AF65-F5344CB8AC3E}">
         <p14:creationId xmlns:p14="http://schemas.microsoft.com/office/powerpoint/2010/main" val="1032657581"/>
+      </p:ext>
+    </p:extLst>
+  </p:cSld>
+  <p:clrMapOvr>
+    <a:masterClrMapping/>
+  </p:clrMapOvr>
+  <p:timing>
+    <p:tnLst>
+      <p:par>
+        <p:cTn id="1" dur="indefinite" restart="never" nodeType="tmRoot"/>
+      </p:par>
+    </p:tnLst>
+  </p:timing>
+</p:sld>
+</file>
+
+<file path=ppt/slides/slide10.xml><?xml version="1.0" encoding="utf-8"?>
+<p:sld xmlns:a="http://schemas.openxmlformats.org/drawingml/2006/main" xmlns:r="http://schemas.openxmlformats.org/officeDocument/2006/relationships" xmlns:p="http://schemas.openxmlformats.org/presentationml/2006/main">
+  <p:cSld>
+    <p:spTree>
+      <p:nvGrpSpPr>
+        <p:cNvPr id="1" name=""/>
+        <p:cNvGrpSpPr/>
+        <p:nvPr/>
+      </p:nvGrpSpPr>
+      <p:grpSpPr>
+        <a:xfrm>
+          <a:off x="0" y="0"/>
+          <a:ext cx="0" cy="0"/>
+          <a:chOff x="0" y="0"/>
+          <a:chExt cx="0" cy="0"/>
+        </a:xfrm>
+      </p:grpSpPr>
+      <p:sp>
+        <p:nvSpPr>
+          <p:cNvPr id="2" name="Title 1"/>
+          <p:cNvSpPr>
+            <a:spLocks noGrp="1"/>
+          </p:cNvSpPr>
+          <p:nvPr>
+            <p:ph type="title"/>
+          </p:nvPr>
+        </p:nvSpPr>
+        <p:spPr/>
+        <p:txBody>
+          <a:bodyPr/>
+          <a:lstStyle/>
+          <a:p>
+            <a:r>
+              <a:rPr lang="en-GB" dirty="0" smtClean="0"/>
+              <a:t>Human Data / Participants</a:t>
+            </a:r>
+            <a:endParaRPr lang="en-GB" dirty="0"/>
+          </a:p>
+        </p:txBody>
+      </p:sp>
+      <p:sp>
+        <p:nvSpPr>
+          <p:cNvPr id="3" name="Content Placeholder 2"/>
+          <p:cNvSpPr>
+            <a:spLocks noGrp="1"/>
+          </p:cNvSpPr>
+          <p:nvPr>
+            <p:ph idx="1"/>
+          </p:nvPr>
+        </p:nvSpPr>
+        <p:spPr/>
+        <p:txBody>
+          <a:bodyPr/>
+          <a:lstStyle/>
+          <a:p>
+            <a:r>
+              <a:rPr lang="en-GB" dirty="0" smtClean="0"/>
+              <a:t>No Human data will be used during the implementation stage</a:t>
+            </a:r>
+          </a:p>
+          <a:p>
+            <a:r>
+              <a:rPr lang="en-GB" dirty="0" smtClean="0"/>
+              <a:t>Human participants are unlikely</a:t>
+            </a:r>
+          </a:p>
+          <a:p>
+            <a:pPr lvl="1"/>
+            <a:r>
+              <a:rPr lang="en-GB" dirty="0" smtClean="0"/>
+              <a:t>May be required later as a way to test run multiple robots together</a:t>
+            </a:r>
+          </a:p>
+          <a:p>
+            <a:pPr lvl="1"/>
+            <a:r>
+              <a:rPr lang="en-GB" dirty="0" smtClean="0"/>
+              <a:t>Required steps will be taken should Human participants be implemented</a:t>
+            </a:r>
+            <a:endParaRPr lang="en-GB" dirty="0"/>
+          </a:p>
+        </p:txBody>
+      </p:sp>
+    </p:spTree>
+    <p:extLst>
+      <p:ext uri="{BB962C8B-B14F-4D97-AF65-F5344CB8AC3E}">
+        <p14:creationId xmlns:p14="http://schemas.microsoft.com/office/powerpoint/2010/main" val="3357549853"/>
+      </p:ext>
+    </p:extLst>
+  </p:cSld>
+  <p:clrMapOvr>
+    <a:masterClrMapping/>
+  </p:clrMapOvr>
+  <p:timing>
+    <p:tnLst>
+      <p:par>
+        <p:cTn id="1" dur="indefinite" restart="never" nodeType="tmRoot"/>
+      </p:par>
+    </p:tnLst>
+  </p:timing>
+</p:sld>
+</file>
+
+<file path=ppt/slides/slide11.xml><?xml version="1.0" encoding="utf-8"?>
+<p:sld xmlns:a="http://schemas.openxmlformats.org/drawingml/2006/main" xmlns:r="http://schemas.openxmlformats.org/officeDocument/2006/relationships" xmlns:p="http://schemas.openxmlformats.org/presentationml/2006/main">
+  <p:cSld>
+    <p:spTree>
+      <p:nvGrpSpPr>
+        <p:cNvPr id="1" name=""/>
+        <p:cNvGrpSpPr/>
+        <p:nvPr/>
+      </p:nvGrpSpPr>
+      <p:grpSpPr>
+        <a:xfrm>
+          <a:off x="0" y="0"/>
+          <a:ext cx="0" cy="0"/>
+          <a:chOff x="0" y="0"/>
+          <a:chExt cx="0" cy="0"/>
+        </a:xfrm>
+      </p:grpSpPr>
+      <p:sp>
+        <p:nvSpPr>
+          <p:cNvPr id="2" name="Title 1"/>
+          <p:cNvSpPr>
+            <a:spLocks noGrp="1"/>
+          </p:cNvSpPr>
+          <p:nvPr>
+            <p:ph type="title"/>
+          </p:nvPr>
+        </p:nvSpPr>
+        <p:spPr/>
+        <p:txBody>
+          <a:bodyPr/>
+          <a:lstStyle/>
+          <a:p>
+            <a:r>
+              <a:rPr lang="en-GB" dirty="0" smtClean="0"/>
+              <a:t>Current Progress</a:t>
+            </a:r>
+            <a:endParaRPr lang="en-GB" dirty="0"/>
+          </a:p>
+        </p:txBody>
+      </p:sp>
+      <p:sp>
+        <p:nvSpPr>
+          <p:cNvPr id="3" name="Content Placeholder 2"/>
+          <p:cNvSpPr>
+            <a:spLocks noGrp="1"/>
+          </p:cNvSpPr>
+          <p:nvPr>
+            <p:ph idx="1"/>
+          </p:nvPr>
+        </p:nvSpPr>
+        <p:spPr/>
+        <p:txBody>
+          <a:bodyPr/>
+          <a:lstStyle/>
+          <a:p>
+            <a:r>
+              <a:rPr lang="en-GB" dirty="0" smtClean="0"/>
+              <a:t>Looking for materials to build the Dark Room</a:t>
+            </a:r>
+          </a:p>
+          <a:p>
+            <a:pPr lvl="1"/>
+            <a:r>
+              <a:rPr lang="en-GB" dirty="0" smtClean="0"/>
+              <a:t>Wood for posts; Metal for clamps etc.</a:t>
+            </a:r>
+          </a:p>
+          <a:p>
+            <a:r>
+              <a:rPr lang="en-GB" dirty="0" smtClean="0"/>
+              <a:t>Revising C programming</a:t>
+            </a:r>
+          </a:p>
+          <a:p>
+            <a:pPr lvl="1"/>
+            <a:r>
+              <a:rPr lang="en-GB" dirty="0" smtClean="0"/>
+              <a:t>Pointers</a:t>
+            </a:r>
+          </a:p>
+          <a:p>
+            <a:pPr lvl="1"/>
+            <a:r>
+              <a:rPr lang="en-GB" dirty="0" smtClean="0"/>
+              <a:t>State Machines</a:t>
+            </a:r>
+          </a:p>
+          <a:p>
+            <a:pPr lvl="1"/>
+            <a:r>
+              <a:rPr lang="en-GB" dirty="0" smtClean="0"/>
+              <a:t>Coding ‘Standards’</a:t>
+            </a:r>
+          </a:p>
+          <a:p>
+            <a:r>
+              <a:rPr lang="en-GB" dirty="0" smtClean="0"/>
+              <a:t>Learning how to implement e-Puck API</a:t>
+            </a:r>
+          </a:p>
+          <a:p>
+            <a:pPr lvl="1"/>
+            <a:r>
+              <a:rPr lang="en-GB" dirty="0" smtClean="0"/>
+              <a:t>Stepping motions for the Motors</a:t>
+            </a:r>
+          </a:p>
+          <a:p>
+            <a:pPr lvl="1"/>
+            <a:r>
+              <a:rPr lang="en-GB" dirty="0" smtClean="0"/>
+              <a:t>IR sensors</a:t>
+            </a:r>
+          </a:p>
+          <a:p>
+            <a:pPr lvl="1"/>
+            <a:r>
+              <a:rPr lang="en-GB" dirty="0" smtClean="0"/>
+              <a:t>Network Connectivity (Bluetooth)</a:t>
+            </a:r>
+            <a:endParaRPr lang="en-GB" dirty="0"/>
+          </a:p>
+        </p:txBody>
+      </p:sp>
+    </p:spTree>
+    <p:extLst>
+      <p:ext uri="{BB962C8B-B14F-4D97-AF65-F5344CB8AC3E}">
+        <p14:creationId xmlns:p14="http://schemas.microsoft.com/office/powerpoint/2010/main" val="2930630844"/>
+      </p:ext>
+    </p:extLst>
+  </p:cSld>
+  <p:clrMapOvr>
+    <a:masterClrMapping/>
+  </p:clrMapOvr>
+  <p:timing>
+    <p:tnLst>
+      <p:par>
+        <p:cTn id="1" dur="indefinite" restart="never" nodeType="tmRoot"/>
+      </p:par>
+    </p:tnLst>
+  </p:timing>
+</p:sld>
+</file>
+
+<file path=ppt/slides/slide12.xml><?xml version="1.0" encoding="utf-8"?>
+<p:sld xmlns:a="http://schemas.openxmlformats.org/drawingml/2006/main" xmlns:r="http://schemas.openxmlformats.org/officeDocument/2006/relationships" xmlns:p="http://schemas.openxmlformats.org/presentationml/2006/main">
+  <p:cSld>
+    <p:spTree>
+      <p:nvGrpSpPr>
+        <p:cNvPr id="1" name=""/>
+        <p:cNvGrpSpPr/>
+        <p:nvPr/>
+      </p:nvGrpSpPr>
+      <p:grpSpPr>
+        <a:xfrm>
+          <a:off x="0" y="0"/>
+          <a:ext cx="0" cy="0"/>
+          <a:chOff x="0" y="0"/>
+          <a:chExt cx="0" cy="0"/>
+        </a:xfrm>
+      </p:grpSpPr>
+      <p:sp>
+        <p:nvSpPr>
+          <p:cNvPr id="3" name="Subtitle 2"/>
+          <p:cNvSpPr>
+            <a:spLocks noGrp="1"/>
+          </p:cNvSpPr>
+          <p:nvPr>
+            <p:ph type="subTitle" idx="1"/>
+          </p:nvPr>
+        </p:nvSpPr>
+        <p:spPr/>
+        <p:txBody>
+          <a:bodyPr/>
+          <a:lstStyle/>
+          <a:p>
+            <a:r>
+              <a:rPr lang="en-GB" smtClean="0"/>
+              <a:t>Any Questions?</a:t>
+            </a:r>
+            <a:endParaRPr lang="en-GB" dirty="0"/>
+          </a:p>
+        </p:txBody>
+      </p:sp>
+      <p:sp>
+        <p:nvSpPr>
+          <p:cNvPr id="2" name="Title 1"/>
+          <p:cNvSpPr>
+            <a:spLocks noGrp="1"/>
+          </p:cNvSpPr>
+          <p:nvPr>
+            <p:ph type="ctrTitle"/>
+          </p:nvPr>
+        </p:nvSpPr>
+        <p:spPr/>
+        <p:txBody>
+          <a:bodyPr/>
+          <a:lstStyle/>
+          <a:p>
+            <a:r>
+              <a:rPr lang="en-GB" sz="2400" dirty="0" smtClean="0"/>
+              <a:t>Thank you for your time</a:t>
+            </a:r>
+            <a:endParaRPr lang="en-GB" sz="2400" dirty="0"/>
+          </a:p>
+        </p:txBody>
+      </p:sp>
+    </p:spTree>
+    <p:extLst>
+      <p:ext uri="{BB962C8B-B14F-4D97-AF65-F5344CB8AC3E}">
+        <p14:creationId xmlns:p14="http://schemas.microsoft.com/office/powerpoint/2010/main" val="2414897227"/>
       </p:ext>
     </p:extLst>
   </p:cSld>
@@ -6561,19 +6913,7 @@
             <a:pPr lvl="1"/>
             <a:r>
               <a:rPr lang="en-GB" dirty="0" smtClean="0"/>
-              <a:t>Two clear states – </a:t>
-            </a:r>
-            <a:r>
-              <a:rPr lang="en-GB" smtClean="0"/>
-              <a:t>when pheromones are </a:t>
-            </a:r>
-            <a:r>
-              <a:rPr lang="en-GB" dirty="0" smtClean="0"/>
-              <a:t>detected; when none </a:t>
-            </a:r>
-            <a:r>
-              <a:rPr lang="en-GB" smtClean="0"/>
-              <a:t>are found </a:t>
+              <a:t>Two clear states – when pheromones are detected; when none are found </a:t>
             </a:r>
             <a:endParaRPr lang="en-GB" dirty="0"/>
           </a:p>
@@ -6613,6 +6953,1115 @@
     <p:extLst>
       <p:ext uri="{BB962C8B-B14F-4D97-AF65-F5344CB8AC3E}">
         <p14:creationId xmlns:p14="http://schemas.microsoft.com/office/powerpoint/2010/main" val="3475246682"/>
+      </p:ext>
+    </p:extLst>
+  </p:cSld>
+  <p:clrMapOvr>
+    <a:masterClrMapping/>
+  </p:clrMapOvr>
+  <p:timing>
+    <p:tnLst>
+      <p:par>
+        <p:cTn id="1" dur="indefinite" restart="never" nodeType="tmRoot">
+          <p:childTnLst>
+            <p:seq concurrent="1" nextAc="seek">
+              <p:cTn id="2" dur="indefinite" nodeType="mainSeq">
+                <p:childTnLst>
+                  <p:par>
+                    <p:cTn id="3" fill="hold">
+                      <p:stCondLst>
+                        <p:cond delay="indefinite"/>
+                      </p:stCondLst>
+                      <p:childTnLst>
+                        <p:par>
+                          <p:cTn id="4" fill="hold">
+                            <p:stCondLst>
+                              <p:cond delay="0"/>
+                            </p:stCondLst>
+                            <p:childTnLst>
+                              <p:par>
+                                <p:cTn id="5" presetID="10" presetClass="entr" presetSubtype="0" fill="hold" nodeType="clickEffect">
+                                  <p:stCondLst>
+                                    <p:cond delay="0"/>
+                                  </p:stCondLst>
+                                  <p:childTnLst>
+                                    <p:set>
+                                      <p:cBhvr>
+                                        <p:cTn id="6" dur="1" fill="hold">
+                                          <p:stCondLst>
+                                            <p:cond delay="0"/>
+                                          </p:stCondLst>
+                                        </p:cTn>
+                                        <p:tgtEl>
+                                          <p:spTgt spid="3">
+                                            <p:txEl>
+                                              <p:pRg st="0" end="0"/>
+                                            </p:txEl>
+                                          </p:spTgt>
+                                        </p:tgtEl>
+                                        <p:attrNameLst>
+                                          <p:attrName>style.visibility</p:attrName>
+                                        </p:attrNameLst>
+                                      </p:cBhvr>
+                                      <p:to>
+                                        <p:strVal val="visible"/>
+                                      </p:to>
+                                    </p:set>
+                                    <p:animEffect transition="in" filter="fade">
+                                      <p:cBhvr>
+                                        <p:cTn id="7" dur="250"/>
+                                        <p:tgtEl>
+                                          <p:spTgt spid="3">
+                                            <p:txEl>
+                                              <p:pRg st="0" end="0"/>
+                                            </p:txEl>
+                                          </p:spTgt>
+                                        </p:tgtEl>
+                                      </p:cBhvr>
+                                    </p:animEffect>
+                                  </p:childTnLst>
+                                </p:cTn>
+                              </p:par>
+                              <p:par>
+                                <p:cTn id="8" presetID="10" presetClass="entr" presetSubtype="0" fill="hold" nodeType="withEffect">
+                                  <p:stCondLst>
+                                    <p:cond delay="0"/>
+                                  </p:stCondLst>
+                                  <p:childTnLst>
+                                    <p:set>
+                                      <p:cBhvr>
+                                        <p:cTn id="9" dur="1" fill="hold">
+                                          <p:stCondLst>
+                                            <p:cond delay="0"/>
+                                          </p:stCondLst>
+                                        </p:cTn>
+                                        <p:tgtEl>
+                                          <p:spTgt spid="3">
+                                            <p:txEl>
+                                              <p:pRg st="1" end="1"/>
+                                            </p:txEl>
+                                          </p:spTgt>
+                                        </p:tgtEl>
+                                        <p:attrNameLst>
+                                          <p:attrName>style.visibility</p:attrName>
+                                        </p:attrNameLst>
+                                      </p:cBhvr>
+                                      <p:to>
+                                        <p:strVal val="visible"/>
+                                      </p:to>
+                                    </p:set>
+                                    <p:animEffect transition="in" filter="fade">
+                                      <p:cBhvr>
+                                        <p:cTn id="10" dur="250"/>
+                                        <p:tgtEl>
+                                          <p:spTgt spid="3">
+                                            <p:txEl>
+                                              <p:pRg st="1" end="1"/>
+                                            </p:txEl>
+                                          </p:spTgt>
+                                        </p:tgtEl>
+                                      </p:cBhvr>
+                                    </p:animEffect>
+                                  </p:childTnLst>
+                                </p:cTn>
+                              </p:par>
+                              <p:par>
+                                <p:cTn id="11" presetID="10" presetClass="entr" presetSubtype="0" fill="hold" nodeType="withEffect">
+                                  <p:stCondLst>
+                                    <p:cond delay="0"/>
+                                  </p:stCondLst>
+                                  <p:childTnLst>
+                                    <p:set>
+                                      <p:cBhvr>
+                                        <p:cTn id="12" dur="1" fill="hold">
+                                          <p:stCondLst>
+                                            <p:cond delay="0"/>
+                                          </p:stCondLst>
+                                        </p:cTn>
+                                        <p:tgtEl>
+                                          <p:spTgt spid="3">
+                                            <p:txEl>
+                                              <p:pRg st="2" end="2"/>
+                                            </p:txEl>
+                                          </p:spTgt>
+                                        </p:tgtEl>
+                                        <p:attrNameLst>
+                                          <p:attrName>style.visibility</p:attrName>
+                                        </p:attrNameLst>
+                                      </p:cBhvr>
+                                      <p:to>
+                                        <p:strVal val="visible"/>
+                                      </p:to>
+                                    </p:set>
+                                    <p:animEffect transition="in" filter="fade">
+                                      <p:cBhvr>
+                                        <p:cTn id="13" dur="250"/>
+                                        <p:tgtEl>
+                                          <p:spTgt spid="3">
+                                            <p:txEl>
+                                              <p:pRg st="2" end="2"/>
+                                            </p:txEl>
+                                          </p:spTgt>
+                                        </p:tgtEl>
+                                      </p:cBhvr>
+                                    </p:animEffect>
+                                  </p:childTnLst>
+                                </p:cTn>
+                              </p:par>
+                              <p:par>
+                                <p:cTn id="14" presetID="10" presetClass="entr" presetSubtype="0" fill="hold" nodeType="withEffect">
+                                  <p:stCondLst>
+                                    <p:cond delay="0"/>
+                                  </p:stCondLst>
+                                  <p:childTnLst>
+                                    <p:set>
+                                      <p:cBhvr>
+                                        <p:cTn id="15" dur="1" fill="hold">
+                                          <p:stCondLst>
+                                            <p:cond delay="0"/>
+                                          </p:stCondLst>
+                                        </p:cTn>
+                                        <p:tgtEl>
+                                          <p:spTgt spid="3">
+                                            <p:txEl>
+                                              <p:pRg st="3" end="3"/>
+                                            </p:txEl>
+                                          </p:spTgt>
+                                        </p:tgtEl>
+                                        <p:attrNameLst>
+                                          <p:attrName>style.visibility</p:attrName>
+                                        </p:attrNameLst>
+                                      </p:cBhvr>
+                                      <p:to>
+                                        <p:strVal val="visible"/>
+                                      </p:to>
+                                    </p:set>
+                                    <p:animEffect transition="in" filter="fade">
+                                      <p:cBhvr>
+                                        <p:cTn id="16" dur="250"/>
+                                        <p:tgtEl>
+                                          <p:spTgt spid="3">
+                                            <p:txEl>
+                                              <p:pRg st="3" end="3"/>
+                                            </p:txEl>
+                                          </p:spTgt>
+                                        </p:tgtEl>
+                                      </p:cBhvr>
+                                    </p:animEffect>
+                                  </p:childTnLst>
+                                </p:cTn>
+                              </p:par>
+                            </p:childTnLst>
+                          </p:cTn>
+                        </p:par>
+                      </p:childTnLst>
+                    </p:cTn>
+                  </p:par>
+                </p:childTnLst>
+              </p:cTn>
+              <p:prevCondLst>
+                <p:cond evt="onPrev" delay="0">
+                  <p:tgtEl>
+                    <p:sldTgt/>
+                  </p:tgtEl>
+                </p:cond>
+              </p:prevCondLst>
+              <p:nextCondLst>
+                <p:cond evt="onNext" delay="0">
+                  <p:tgtEl>
+                    <p:sldTgt/>
+                  </p:tgtEl>
+                </p:cond>
+              </p:nextCondLst>
+            </p:seq>
+          </p:childTnLst>
+        </p:cTn>
+      </p:par>
+    </p:tnLst>
+  </p:timing>
+</p:sld>
+</file>
+
+<file path=ppt/slides/slide7.xml><?xml version="1.0" encoding="utf-8"?>
+<p:sld xmlns:a="http://schemas.openxmlformats.org/drawingml/2006/main" xmlns:r="http://schemas.openxmlformats.org/officeDocument/2006/relationships" xmlns:p="http://schemas.openxmlformats.org/presentationml/2006/main">
+  <p:cSld>
+    <p:spTree>
+      <p:nvGrpSpPr>
+        <p:cNvPr id="1" name=""/>
+        <p:cNvGrpSpPr/>
+        <p:nvPr/>
+      </p:nvGrpSpPr>
+      <p:grpSpPr>
+        <a:xfrm>
+          <a:off x="0" y="0"/>
+          <a:ext cx="0" cy="0"/>
+          <a:chOff x="0" y="0"/>
+          <a:chExt cx="0" cy="0"/>
+        </a:xfrm>
+      </p:grpSpPr>
+      <p:sp>
+        <p:nvSpPr>
+          <p:cNvPr id="2" name="Title 1"/>
+          <p:cNvSpPr>
+            <a:spLocks noGrp="1"/>
+          </p:cNvSpPr>
+          <p:nvPr>
+            <p:ph type="title"/>
+          </p:nvPr>
+        </p:nvSpPr>
+        <p:spPr/>
+        <p:txBody>
+          <a:bodyPr/>
+          <a:lstStyle/>
+          <a:p>
+            <a:r>
+              <a:rPr lang="en-GB" dirty="0" smtClean="0"/>
+              <a:t>Component: Code</a:t>
+            </a:r>
+            <a:endParaRPr lang="en-GB" dirty="0"/>
+          </a:p>
+        </p:txBody>
+      </p:sp>
+      <p:sp>
+        <p:nvSpPr>
+          <p:cNvPr id="3" name="Content Placeholder 2"/>
+          <p:cNvSpPr>
+            <a:spLocks noGrp="1"/>
+          </p:cNvSpPr>
+          <p:nvPr>
+            <p:ph idx="1"/>
+          </p:nvPr>
+        </p:nvSpPr>
+        <p:spPr/>
+        <p:txBody>
+          <a:bodyPr/>
+          <a:lstStyle/>
+          <a:p>
+            <a:r>
+              <a:rPr lang="en-GB" dirty="0" err="1" smtClean="0"/>
+              <a:t>BeePCo</a:t>
+            </a:r>
+            <a:r>
+              <a:rPr lang="en-GB" dirty="0" smtClean="0"/>
+              <a:t> / </a:t>
+            </a:r>
+            <a:r>
+              <a:rPr lang="en-GB" dirty="0" err="1" smtClean="0"/>
+              <a:t>HybaCo</a:t>
+            </a:r>
+            <a:endParaRPr lang="en-GB" dirty="0" smtClean="0"/>
+          </a:p>
+          <a:p>
+            <a:pPr lvl="1"/>
+            <a:r>
+              <a:rPr lang="en-GB" dirty="0" smtClean="0"/>
+              <a:t>Extension if time permits</a:t>
+            </a:r>
+          </a:p>
+          <a:p>
+            <a:pPr lvl="1"/>
+            <a:r>
+              <a:rPr lang="en-GB" dirty="0" smtClean="0"/>
+              <a:t>Use e-Puck’s interface to decide which algorithm to run</a:t>
+            </a:r>
+          </a:p>
+          <a:p>
+            <a:pPr lvl="1"/>
+            <a:r>
+              <a:rPr lang="en-GB" dirty="0" smtClean="0"/>
+              <a:t>Doubtful that range would be a problem in this project</a:t>
+            </a:r>
+          </a:p>
+          <a:p>
+            <a:pPr lvl="2"/>
+            <a:r>
+              <a:rPr lang="en-GB" dirty="0" smtClean="0"/>
+              <a:t>Memory may be the deciding factor</a:t>
+            </a:r>
+          </a:p>
+          <a:p>
+            <a:pPr lvl="1"/>
+            <a:endParaRPr lang="en-GB" dirty="0" smtClean="0"/>
+          </a:p>
+          <a:p>
+            <a:pPr lvl="1"/>
+            <a:endParaRPr lang="en-GB" dirty="0"/>
+          </a:p>
+        </p:txBody>
+      </p:sp>
+    </p:spTree>
+    <p:extLst>
+      <p:ext uri="{BB962C8B-B14F-4D97-AF65-F5344CB8AC3E}">
+        <p14:creationId xmlns:p14="http://schemas.microsoft.com/office/powerpoint/2010/main" val="886660212"/>
+      </p:ext>
+    </p:extLst>
+  </p:cSld>
+  <p:clrMapOvr>
+    <a:masterClrMapping/>
+  </p:clrMapOvr>
+  <p:timing>
+    <p:tnLst>
+      <p:par>
+        <p:cTn id="1" dur="indefinite" restart="never" nodeType="tmRoot">
+          <p:childTnLst>
+            <p:seq concurrent="1" nextAc="seek">
+              <p:cTn id="2" dur="indefinite" nodeType="mainSeq">
+                <p:childTnLst>
+                  <p:par>
+                    <p:cTn id="3" fill="hold">
+                      <p:stCondLst>
+                        <p:cond delay="indefinite"/>
+                      </p:stCondLst>
+                      <p:childTnLst>
+                        <p:par>
+                          <p:cTn id="4" fill="hold">
+                            <p:stCondLst>
+                              <p:cond delay="0"/>
+                            </p:stCondLst>
+                            <p:childTnLst>
+                              <p:par>
+                                <p:cTn id="5" presetID="10" presetClass="entr" presetSubtype="0" fill="hold" nodeType="clickEffect">
+                                  <p:stCondLst>
+                                    <p:cond delay="0"/>
+                                  </p:stCondLst>
+                                  <p:childTnLst>
+                                    <p:set>
+                                      <p:cBhvr>
+                                        <p:cTn id="6" dur="1" fill="hold">
+                                          <p:stCondLst>
+                                            <p:cond delay="0"/>
+                                          </p:stCondLst>
+                                        </p:cTn>
+                                        <p:tgtEl>
+                                          <p:spTgt spid="3">
+                                            <p:txEl>
+                                              <p:pRg st="0" end="0"/>
+                                            </p:txEl>
+                                          </p:spTgt>
+                                        </p:tgtEl>
+                                        <p:attrNameLst>
+                                          <p:attrName>style.visibility</p:attrName>
+                                        </p:attrNameLst>
+                                      </p:cBhvr>
+                                      <p:to>
+                                        <p:strVal val="visible"/>
+                                      </p:to>
+                                    </p:set>
+                                    <p:animEffect transition="in" filter="fade">
+                                      <p:cBhvr>
+                                        <p:cTn id="7" dur="250"/>
+                                        <p:tgtEl>
+                                          <p:spTgt spid="3">
+                                            <p:txEl>
+                                              <p:pRg st="0" end="0"/>
+                                            </p:txEl>
+                                          </p:spTgt>
+                                        </p:tgtEl>
+                                      </p:cBhvr>
+                                    </p:animEffect>
+                                  </p:childTnLst>
+                                </p:cTn>
+                              </p:par>
+                              <p:par>
+                                <p:cTn id="8" presetID="10" presetClass="entr" presetSubtype="0" fill="hold" nodeType="withEffect">
+                                  <p:stCondLst>
+                                    <p:cond delay="0"/>
+                                  </p:stCondLst>
+                                  <p:childTnLst>
+                                    <p:set>
+                                      <p:cBhvr>
+                                        <p:cTn id="9" dur="1" fill="hold">
+                                          <p:stCondLst>
+                                            <p:cond delay="0"/>
+                                          </p:stCondLst>
+                                        </p:cTn>
+                                        <p:tgtEl>
+                                          <p:spTgt spid="3">
+                                            <p:txEl>
+                                              <p:pRg st="1" end="1"/>
+                                            </p:txEl>
+                                          </p:spTgt>
+                                        </p:tgtEl>
+                                        <p:attrNameLst>
+                                          <p:attrName>style.visibility</p:attrName>
+                                        </p:attrNameLst>
+                                      </p:cBhvr>
+                                      <p:to>
+                                        <p:strVal val="visible"/>
+                                      </p:to>
+                                    </p:set>
+                                    <p:animEffect transition="in" filter="fade">
+                                      <p:cBhvr>
+                                        <p:cTn id="10" dur="250"/>
+                                        <p:tgtEl>
+                                          <p:spTgt spid="3">
+                                            <p:txEl>
+                                              <p:pRg st="1" end="1"/>
+                                            </p:txEl>
+                                          </p:spTgt>
+                                        </p:tgtEl>
+                                      </p:cBhvr>
+                                    </p:animEffect>
+                                  </p:childTnLst>
+                                </p:cTn>
+                              </p:par>
+                              <p:par>
+                                <p:cTn id="11" presetID="10" presetClass="entr" presetSubtype="0" fill="hold" nodeType="withEffect">
+                                  <p:stCondLst>
+                                    <p:cond delay="0"/>
+                                  </p:stCondLst>
+                                  <p:childTnLst>
+                                    <p:set>
+                                      <p:cBhvr>
+                                        <p:cTn id="12" dur="1" fill="hold">
+                                          <p:stCondLst>
+                                            <p:cond delay="0"/>
+                                          </p:stCondLst>
+                                        </p:cTn>
+                                        <p:tgtEl>
+                                          <p:spTgt spid="3">
+                                            <p:txEl>
+                                              <p:pRg st="2" end="2"/>
+                                            </p:txEl>
+                                          </p:spTgt>
+                                        </p:tgtEl>
+                                        <p:attrNameLst>
+                                          <p:attrName>style.visibility</p:attrName>
+                                        </p:attrNameLst>
+                                      </p:cBhvr>
+                                      <p:to>
+                                        <p:strVal val="visible"/>
+                                      </p:to>
+                                    </p:set>
+                                    <p:animEffect transition="in" filter="fade">
+                                      <p:cBhvr>
+                                        <p:cTn id="13" dur="250"/>
+                                        <p:tgtEl>
+                                          <p:spTgt spid="3">
+                                            <p:txEl>
+                                              <p:pRg st="2" end="2"/>
+                                            </p:txEl>
+                                          </p:spTgt>
+                                        </p:tgtEl>
+                                      </p:cBhvr>
+                                    </p:animEffect>
+                                  </p:childTnLst>
+                                </p:cTn>
+                              </p:par>
+                              <p:par>
+                                <p:cTn id="14" presetID="10" presetClass="entr" presetSubtype="0" fill="hold" nodeType="withEffect">
+                                  <p:stCondLst>
+                                    <p:cond delay="0"/>
+                                  </p:stCondLst>
+                                  <p:childTnLst>
+                                    <p:set>
+                                      <p:cBhvr>
+                                        <p:cTn id="15" dur="1" fill="hold">
+                                          <p:stCondLst>
+                                            <p:cond delay="0"/>
+                                          </p:stCondLst>
+                                        </p:cTn>
+                                        <p:tgtEl>
+                                          <p:spTgt spid="3">
+                                            <p:txEl>
+                                              <p:pRg st="3" end="3"/>
+                                            </p:txEl>
+                                          </p:spTgt>
+                                        </p:tgtEl>
+                                        <p:attrNameLst>
+                                          <p:attrName>style.visibility</p:attrName>
+                                        </p:attrNameLst>
+                                      </p:cBhvr>
+                                      <p:to>
+                                        <p:strVal val="visible"/>
+                                      </p:to>
+                                    </p:set>
+                                    <p:animEffect transition="in" filter="fade">
+                                      <p:cBhvr>
+                                        <p:cTn id="16" dur="250"/>
+                                        <p:tgtEl>
+                                          <p:spTgt spid="3">
+                                            <p:txEl>
+                                              <p:pRg st="3" end="3"/>
+                                            </p:txEl>
+                                          </p:spTgt>
+                                        </p:tgtEl>
+                                      </p:cBhvr>
+                                    </p:animEffect>
+                                  </p:childTnLst>
+                                </p:cTn>
+                              </p:par>
+                              <p:par>
+                                <p:cTn id="17" presetID="10" presetClass="entr" presetSubtype="0" fill="hold" nodeType="withEffect">
+                                  <p:stCondLst>
+                                    <p:cond delay="0"/>
+                                  </p:stCondLst>
+                                  <p:childTnLst>
+                                    <p:set>
+                                      <p:cBhvr>
+                                        <p:cTn id="18" dur="1" fill="hold">
+                                          <p:stCondLst>
+                                            <p:cond delay="0"/>
+                                          </p:stCondLst>
+                                        </p:cTn>
+                                        <p:tgtEl>
+                                          <p:spTgt spid="3">
+                                            <p:txEl>
+                                              <p:pRg st="4" end="4"/>
+                                            </p:txEl>
+                                          </p:spTgt>
+                                        </p:tgtEl>
+                                        <p:attrNameLst>
+                                          <p:attrName>style.visibility</p:attrName>
+                                        </p:attrNameLst>
+                                      </p:cBhvr>
+                                      <p:to>
+                                        <p:strVal val="visible"/>
+                                      </p:to>
+                                    </p:set>
+                                    <p:animEffect transition="in" filter="fade">
+                                      <p:cBhvr>
+                                        <p:cTn id="19" dur="250"/>
+                                        <p:tgtEl>
+                                          <p:spTgt spid="3">
+                                            <p:txEl>
+                                              <p:pRg st="4" end="4"/>
+                                            </p:txEl>
+                                          </p:spTgt>
+                                        </p:tgtEl>
+                                      </p:cBhvr>
+                                    </p:animEffect>
+                                  </p:childTnLst>
+                                </p:cTn>
+                              </p:par>
+                            </p:childTnLst>
+                          </p:cTn>
+                        </p:par>
+                      </p:childTnLst>
+                    </p:cTn>
+                  </p:par>
+                </p:childTnLst>
+              </p:cTn>
+              <p:prevCondLst>
+                <p:cond evt="onPrev" delay="0">
+                  <p:tgtEl>
+                    <p:sldTgt/>
+                  </p:tgtEl>
+                </p:cond>
+              </p:prevCondLst>
+              <p:nextCondLst>
+                <p:cond evt="onNext" delay="0">
+                  <p:tgtEl>
+                    <p:sldTgt/>
+                  </p:tgtEl>
+                </p:cond>
+              </p:nextCondLst>
+            </p:seq>
+          </p:childTnLst>
+        </p:cTn>
+      </p:par>
+    </p:tnLst>
+  </p:timing>
+</p:sld>
+</file>
+
+<file path=ppt/slides/slide8.xml><?xml version="1.0" encoding="utf-8"?>
+<p:sld xmlns:a="http://schemas.openxmlformats.org/drawingml/2006/main" xmlns:r="http://schemas.openxmlformats.org/officeDocument/2006/relationships" xmlns:p="http://schemas.openxmlformats.org/presentationml/2006/main">
+  <p:cSld>
+    <p:spTree>
+      <p:nvGrpSpPr>
+        <p:cNvPr id="1" name=""/>
+        <p:cNvGrpSpPr/>
+        <p:nvPr/>
+      </p:nvGrpSpPr>
+      <p:grpSpPr>
+        <a:xfrm>
+          <a:off x="0" y="0"/>
+          <a:ext cx="0" cy="0"/>
+          <a:chOff x="0" y="0"/>
+          <a:chExt cx="0" cy="0"/>
+        </a:xfrm>
+      </p:grpSpPr>
+      <p:sp>
+        <p:nvSpPr>
+          <p:cNvPr id="2" name="Title 1"/>
+          <p:cNvSpPr>
+            <a:spLocks noGrp="1"/>
+          </p:cNvSpPr>
+          <p:nvPr>
+            <p:ph type="title"/>
+          </p:nvPr>
+        </p:nvSpPr>
+        <p:spPr/>
+        <p:txBody>
+          <a:bodyPr/>
+          <a:lstStyle/>
+          <a:p>
+            <a:r>
+              <a:rPr lang="en-GB" dirty="0" smtClean="0"/>
+              <a:t>Evaluation: Arena</a:t>
+            </a:r>
+            <a:endParaRPr lang="en-GB" dirty="0"/>
+          </a:p>
+        </p:txBody>
+      </p:sp>
+      <p:sp>
+        <p:nvSpPr>
+          <p:cNvPr id="3" name="Content Placeholder 2"/>
+          <p:cNvSpPr>
+            <a:spLocks noGrp="1"/>
+          </p:cNvSpPr>
+          <p:nvPr>
+            <p:ph idx="1"/>
+          </p:nvPr>
+        </p:nvSpPr>
+        <p:spPr/>
+        <p:txBody>
+          <a:bodyPr/>
+          <a:lstStyle/>
+          <a:p>
+            <a:r>
+              <a:rPr lang="en-GB" dirty="0" smtClean="0"/>
+              <a:t>Can it house a multi-agent system?</a:t>
+            </a:r>
+          </a:p>
+          <a:p>
+            <a:r>
+              <a:rPr lang="en-GB" dirty="0" smtClean="0"/>
+              <a:t>Can it hold robots without them leaving the area?</a:t>
+            </a:r>
+          </a:p>
+          <a:p>
+            <a:r>
+              <a:rPr lang="en-GB" dirty="0" smtClean="0"/>
+              <a:t>Will it be dark enough to not affect the testing?</a:t>
+            </a:r>
+          </a:p>
+          <a:p>
+            <a:pPr lvl="1"/>
+            <a:r>
+              <a:rPr lang="en-GB" dirty="0" smtClean="0"/>
+              <a:t>Will it be bright enough to effectively evaluate the robot?</a:t>
+            </a:r>
+          </a:p>
+          <a:p>
+            <a:r>
+              <a:rPr lang="en-GB" dirty="0" smtClean="0"/>
+              <a:t>Is the setup complete within a reasonable time?</a:t>
+            </a:r>
+          </a:p>
+        </p:txBody>
+      </p:sp>
+    </p:spTree>
+    <p:extLst>
+      <p:ext uri="{BB962C8B-B14F-4D97-AF65-F5344CB8AC3E}">
+        <p14:creationId xmlns:p14="http://schemas.microsoft.com/office/powerpoint/2010/main" val="203496584"/>
+      </p:ext>
+    </p:extLst>
+  </p:cSld>
+  <p:clrMapOvr>
+    <a:masterClrMapping/>
+  </p:clrMapOvr>
+  <p:timing>
+    <p:tnLst>
+      <p:par>
+        <p:cTn id="1" dur="indefinite" restart="never" nodeType="tmRoot">
+          <p:childTnLst>
+            <p:seq concurrent="1" nextAc="seek">
+              <p:cTn id="2" dur="indefinite" nodeType="mainSeq">
+                <p:childTnLst>
+                  <p:par>
+                    <p:cTn id="3" fill="hold">
+                      <p:stCondLst>
+                        <p:cond delay="indefinite"/>
+                      </p:stCondLst>
+                      <p:childTnLst>
+                        <p:par>
+                          <p:cTn id="4" fill="hold">
+                            <p:stCondLst>
+                              <p:cond delay="0"/>
+                            </p:stCondLst>
+                            <p:childTnLst>
+                              <p:par>
+                                <p:cTn id="5" presetID="10" presetClass="entr" presetSubtype="0" fill="hold" nodeType="clickEffect">
+                                  <p:stCondLst>
+                                    <p:cond delay="0"/>
+                                  </p:stCondLst>
+                                  <p:childTnLst>
+                                    <p:set>
+                                      <p:cBhvr>
+                                        <p:cTn id="6" dur="1" fill="hold">
+                                          <p:stCondLst>
+                                            <p:cond delay="0"/>
+                                          </p:stCondLst>
+                                        </p:cTn>
+                                        <p:tgtEl>
+                                          <p:spTgt spid="3">
+                                            <p:txEl>
+                                              <p:pRg st="0" end="0"/>
+                                            </p:txEl>
+                                          </p:spTgt>
+                                        </p:tgtEl>
+                                        <p:attrNameLst>
+                                          <p:attrName>style.visibility</p:attrName>
+                                        </p:attrNameLst>
+                                      </p:cBhvr>
+                                      <p:to>
+                                        <p:strVal val="visible"/>
+                                      </p:to>
+                                    </p:set>
+                                    <p:animEffect transition="in" filter="fade">
+                                      <p:cBhvr>
+                                        <p:cTn id="7" dur="250"/>
+                                        <p:tgtEl>
+                                          <p:spTgt spid="3">
+                                            <p:txEl>
+                                              <p:pRg st="0" end="0"/>
+                                            </p:txEl>
+                                          </p:spTgt>
+                                        </p:tgtEl>
+                                      </p:cBhvr>
+                                    </p:animEffect>
+                                  </p:childTnLst>
+                                </p:cTn>
+                              </p:par>
+                              <p:par>
+                                <p:cTn id="8" presetID="10" presetClass="entr" presetSubtype="0" fill="hold" nodeType="withEffect">
+                                  <p:stCondLst>
+                                    <p:cond delay="0"/>
+                                  </p:stCondLst>
+                                  <p:childTnLst>
+                                    <p:set>
+                                      <p:cBhvr>
+                                        <p:cTn id="9" dur="1" fill="hold">
+                                          <p:stCondLst>
+                                            <p:cond delay="0"/>
+                                          </p:stCondLst>
+                                        </p:cTn>
+                                        <p:tgtEl>
+                                          <p:spTgt spid="3">
+                                            <p:txEl>
+                                              <p:pRg st="1" end="1"/>
+                                            </p:txEl>
+                                          </p:spTgt>
+                                        </p:tgtEl>
+                                        <p:attrNameLst>
+                                          <p:attrName>style.visibility</p:attrName>
+                                        </p:attrNameLst>
+                                      </p:cBhvr>
+                                      <p:to>
+                                        <p:strVal val="visible"/>
+                                      </p:to>
+                                    </p:set>
+                                    <p:animEffect transition="in" filter="fade">
+                                      <p:cBhvr>
+                                        <p:cTn id="10" dur="250"/>
+                                        <p:tgtEl>
+                                          <p:spTgt spid="3">
+                                            <p:txEl>
+                                              <p:pRg st="1" end="1"/>
+                                            </p:txEl>
+                                          </p:spTgt>
+                                        </p:tgtEl>
+                                      </p:cBhvr>
+                                    </p:animEffect>
+                                  </p:childTnLst>
+                                </p:cTn>
+                              </p:par>
+                              <p:par>
+                                <p:cTn id="11" presetID="10" presetClass="entr" presetSubtype="0" fill="hold" nodeType="withEffect">
+                                  <p:stCondLst>
+                                    <p:cond delay="0"/>
+                                  </p:stCondLst>
+                                  <p:childTnLst>
+                                    <p:set>
+                                      <p:cBhvr>
+                                        <p:cTn id="12" dur="1" fill="hold">
+                                          <p:stCondLst>
+                                            <p:cond delay="0"/>
+                                          </p:stCondLst>
+                                        </p:cTn>
+                                        <p:tgtEl>
+                                          <p:spTgt spid="3">
+                                            <p:txEl>
+                                              <p:pRg st="2" end="2"/>
+                                            </p:txEl>
+                                          </p:spTgt>
+                                        </p:tgtEl>
+                                        <p:attrNameLst>
+                                          <p:attrName>style.visibility</p:attrName>
+                                        </p:attrNameLst>
+                                      </p:cBhvr>
+                                      <p:to>
+                                        <p:strVal val="visible"/>
+                                      </p:to>
+                                    </p:set>
+                                    <p:animEffect transition="in" filter="fade">
+                                      <p:cBhvr>
+                                        <p:cTn id="13" dur="250"/>
+                                        <p:tgtEl>
+                                          <p:spTgt spid="3">
+                                            <p:txEl>
+                                              <p:pRg st="2" end="2"/>
+                                            </p:txEl>
+                                          </p:spTgt>
+                                        </p:tgtEl>
+                                      </p:cBhvr>
+                                    </p:animEffect>
+                                  </p:childTnLst>
+                                </p:cTn>
+                              </p:par>
+                              <p:par>
+                                <p:cTn id="14" presetID="10" presetClass="entr" presetSubtype="0" fill="hold" nodeType="withEffect">
+                                  <p:stCondLst>
+                                    <p:cond delay="0"/>
+                                  </p:stCondLst>
+                                  <p:childTnLst>
+                                    <p:set>
+                                      <p:cBhvr>
+                                        <p:cTn id="15" dur="1" fill="hold">
+                                          <p:stCondLst>
+                                            <p:cond delay="0"/>
+                                          </p:stCondLst>
+                                        </p:cTn>
+                                        <p:tgtEl>
+                                          <p:spTgt spid="3">
+                                            <p:txEl>
+                                              <p:pRg st="3" end="3"/>
+                                            </p:txEl>
+                                          </p:spTgt>
+                                        </p:tgtEl>
+                                        <p:attrNameLst>
+                                          <p:attrName>style.visibility</p:attrName>
+                                        </p:attrNameLst>
+                                      </p:cBhvr>
+                                      <p:to>
+                                        <p:strVal val="visible"/>
+                                      </p:to>
+                                    </p:set>
+                                    <p:animEffect transition="in" filter="fade">
+                                      <p:cBhvr>
+                                        <p:cTn id="16" dur="250"/>
+                                        <p:tgtEl>
+                                          <p:spTgt spid="3">
+                                            <p:txEl>
+                                              <p:pRg st="3" end="3"/>
+                                            </p:txEl>
+                                          </p:spTgt>
+                                        </p:tgtEl>
+                                      </p:cBhvr>
+                                    </p:animEffect>
+                                  </p:childTnLst>
+                                </p:cTn>
+                              </p:par>
+                              <p:par>
+                                <p:cTn id="17" presetID="10" presetClass="entr" presetSubtype="0" fill="hold" nodeType="withEffect">
+                                  <p:stCondLst>
+                                    <p:cond delay="0"/>
+                                  </p:stCondLst>
+                                  <p:childTnLst>
+                                    <p:set>
+                                      <p:cBhvr>
+                                        <p:cTn id="18" dur="1" fill="hold">
+                                          <p:stCondLst>
+                                            <p:cond delay="0"/>
+                                          </p:stCondLst>
+                                        </p:cTn>
+                                        <p:tgtEl>
+                                          <p:spTgt spid="3">
+                                            <p:txEl>
+                                              <p:pRg st="4" end="4"/>
+                                            </p:txEl>
+                                          </p:spTgt>
+                                        </p:tgtEl>
+                                        <p:attrNameLst>
+                                          <p:attrName>style.visibility</p:attrName>
+                                        </p:attrNameLst>
+                                      </p:cBhvr>
+                                      <p:to>
+                                        <p:strVal val="visible"/>
+                                      </p:to>
+                                    </p:set>
+                                    <p:animEffect transition="in" filter="fade">
+                                      <p:cBhvr>
+                                        <p:cTn id="19" dur="250"/>
+                                        <p:tgtEl>
+                                          <p:spTgt spid="3">
+                                            <p:txEl>
+                                              <p:pRg st="4" end="4"/>
+                                            </p:txEl>
+                                          </p:spTgt>
+                                        </p:tgtEl>
+                                      </p:cBhvr>
+                                    </p:animEffect>
+                                  </p:childTnLst>
+                                </p:cTn>
+                              </p:par>
+                            </p:childTnLst>
+                          </p:cTn>
+                        </p:par>
+                      </p:childTnLst>
+                    </p:cTn>
+                  </p:par>
+                </p:childTnLst>
+              </p:cTn>
+              <p:prevCondLst>
+                <p:cond evt="onPrev" delay="0">
+                  <p:tgtEl>
+                    <p:sldTgt/>
+                  </p:tgtEl>
+                </p:cond>
+              </p:prevCondLst>
+              <p:nextCondLst>
+                <p:cond evt="onNext" delay="0">
+                  <p:tgtEl>
+                    <p:sldTgt/>
+                  </p:tgtEl>
+                </p:cond>
+              </p:nextCondLst>
+            </p:seq>
+          </p:childTnLst>
+        </p:cTn>
+      </p:par>
+    </p:tnLst>
+  </p:timing>
+</p:sld>
+</file>
+
+<file path=ppt/slides/slide9.xml><?xml version="1.0" encoding="utf-8"?>
+<p:sld xmlns:a="http://schemas.openxmlformats.org/drawingml/2006/main" xmlns:r="http://schemas.openxmlformats.org/officeDocument/2006/relationships" xmlns:p="http://schemas.openxmlformats.org/presentationml/2006/main">
+  <p:cSld>
+    <p:spTree>
+      <p:nvGrpSpPr>
+        <p:cNvPr id="1" name=""/>
+        <p:cNvGrpSpPr/>
+        <p:nvPr/>
+      </p:nvGrpSpPr>
+      <p:grpSpPr>
+        <a:xfrm>
+          <a:off x="0" y="0"/>
+          <a:ext cx="0" cy="0"/>
+          <a:chOff x="0" y="0"/>
+          <a:chExt cx="0" cy="0"/>
+        </a:xfrm>
+      </p:grpSpPr>
+      <p:sp>
+        <p:nvSpPr>
+          <p:cNvPr id="2" name="Title 1"/>
+          <p:cNvSpPr>
+            <a:spLocks noGrp="1"/>
+          </p:cNvSpPr>
+          <p:nvPr>
+            <p:ph type="title"/>
+          </p:nvPr>
+        </p:nvSpPr>
+        <p:spPr/>
+        <p:txBody>
+          <a:bodyPr/>
+          <a:lstStyle/>
+          <a:p>
+            <a:r>
+              <a:rPr lang="en-GB" dirty="0" smtClean="0"/>
+              <a:t>Evaluation: Robot</a:t>
+            </a:r>
+            <a:endParaRPr lang="en-GB" dirty="0"/>
+          </a:p>
+        </p:txBody>
+      </p:sp>
+      <p:sp>
+        <p:nvSpPr>
+          <p:cNvPr id="3" name="Content Placeholder 2"/>
+          <p:cNvSpPr>
+            <a:spLocks noGrp="1"/>
+          </p:cNvSpPr>
+          <p:nvPr>
+            <p:ph idx="1"/>
+          </p:nvPr>
+        </p:nvSpPr>
+        <p:spPr/>
+        <p:txBody>
+          <a:bodyPr/>
+          <a:lstStyle/>
+          <a:p>
+            <a:r>
+              <a:rPr lang="en-GB" dirty="0" smtClean="0"/>
+              <a:t>All the required functionality covered?</a:t>
+            </a:r>
+          </a:p>
+          <a:p>
+            <a:pPr lvl="1"/>
+            <a:r>
+              <a:rPr lang="en-GB" dirty="0" smtClean="0"/>
+              <a:t>Interaction with localised light</a:t>
+            </a:r>
+          </a:p>
+          <a:p>
+            <a:pPr lvl="1"/>
+            <a:r>
+              <a:rPr lang="en-GB" dirty="0" smtClean="0"/>
+              <a:t>Correct implementation of the Algorithm/s</a:t>
+            </a:r>
+          </a:p>
+          <a:p>
+            <a:r>
+              <a:rPr lang="en-GB" dirty="0" smtClean="0"/>
+              <a:t>Will it be efficient enough?</a:t>
+            </a:r>
+          </a:p>
+          <a:p>
+            <a:pPr lvl="1"/>
+            <a:r>
+              <a:rPr lang="en-GB" dirty="0" smtClean="0"/>
+              <a:t>Coding on a new platform takes time – refactor</a:t>
+            </a:r>
+          </a:p>
+          <a:p>
+            <a:r>
+              <a:rPr lang="en-GB" dirty="0" smtClean="0"/>
+              <a:t>Any of the optional functionality covered?</a:t>
+            </a:r>
+          </a:p>
+          <a:p>
+            <a:pPr lvl="1"/>
+            <a:r>
+              <a:rPr lang="en-GB" dirty="0" smtClean="0"/>
+              <a:t>Implementing a second algorithm to run alongside</a:t>
+            </a:r>
+          </a:p>
+          <a:p>
+            <a:pPr lvl="1"/>
+            <a:r>
+              <a:rPr lang="en-GB" dirty="0" smtClean="0"/>
+              <a:t>Using </a:t>
+            </a:r>
+            <a:r>
+              <a:rPr lang="en-GB" dirty="0" err="1" smtClean="0"/>
+              <a:t>HybaCo</a:t>
+            </a:r>
+            <a:r>
+              <a:rPr lang="en-GB" dirty="0" smtClean="0"/>
+              <a:t> as a wrapper between </a:t>
+            </a:r>
+            <a:r>
+              <a:rPr lang="en-GB" dirty="0" err="1" smtClean="0"/>
+              <a:t>StiCo</a:t>
+            </a:r>
+            <a:r>
+              <a:rPr lang="en-GB" dirty="0" smtClean="0"/>
+              <a:t>/</a:t>
+            </a:r>
+            <a:r>
+              <a:rPr lang="en-GB" dirty="0" err="1" smtClean="0"/>
+              <a:t>BeePCo</a:t>
+            </a:r>
+            <a:endParaRPr lang="en-GB" dirty="0" smtClean="0"/>
+          </a:p>
+        </p:txBody>
+      </p:sp>
+    </p:spTree>
+    <p:extLst>
+      <p:ext uri="{BB962C8B-B14F-4D97-AF65-F5344CB8AC3E}">
+        <p14:creationId xmlns:p14="http://schemas.microsoft.com/office/powerpoint/2010/main" val="914457712"/>
       </p:ext>
     </p:extLst>
   </p:cSld>

</xml_diff>